<commit_message>
Update ADome GUI progression.pptx
</commit_message>
<xml_diff>
--- a/Progression/ADome GUI progression.pptx
+++ b/Progression/ADome GUI progression.pptx
@@ -23,6 +23,8 @@
     <p:sldId id="274" r:id="rId17"/>
     <p:sldId id="275" r:id="rId18"/>
     <p:sldId id="276" r:id="rId19"/>
+    <p:sldId id="277" r:id="rId20"/>
+    <p:sldId id="278" r:id="rId21"/>
   </p:sldIdLst>
   <p:sldSz cx="12192000" cy="6858000"/>
   <p:notesSz cx="6858000" cy="9144000"/>
@@ -132,7 +134,7 @@
 <file path=ppt/revisionInfo.xml><?xml version="1.0" encoding="utf-8"?>
 <p1510:revInfo xmlns:a="http://schemas.openxmlformats.org/drawingml/2006/main" xmlns:r="http://schemas.openxmlformats.org/officeDocument/2006/relationships" xmlns:p1510="http://schemas.microsoft.com/office/powerpoint/2015/10/main">
   <p1510:revLst>
-    <p1510:client id="{69E30B14-3982-47BF-9822-8905AF8B16C5}" v="9" dt="2022-10-13T10:19:59.769"/>
+    <p1510:client id="{69E30B14-3982-47BF-9822-8905AF8B16C5}" v="13" dt="2022-10-14T13:02:41.549"/>
   </p1510:revLst>
 </p1510:revInfo>
 </file>
@@ -141,8 +143,8 @@
 <pc:chgInfo xmlns:a="http://schemas.openxmlformats.org/drawingml/2006/main" xmlns:r="http://schemas.openxmlformats.org/officeDocument/2006/relationships" xmlns:ac="http://schemas.microsoft.com/office/drawing/2013/main/command" xmlns:pc="http://schemas.microsoft.com/office/powerpoint/2013/main/command">
   <pc:docChgLst>
     <pc:chgData name="alec daalman" userId="7bf6d2f418bbb9e9" providerId="LiveId" clId="{69E30B14-3982-47BF-9822-8905AF8B16C5}"/>
-    <pc:docChg chg="undo custSel addSld delSld modSld">
-      <pc:chgData name="alec daalman" userId="7bf6d2f418bbb9e9" providerId="LiveId" clId="{69E30B14-3982-47BF-9822-8905AF8B16C5}" dt="2022-10-13T10:21:50.805" v="930" actId="680"/>
+    <pc:docChg chg="undo custSel addSld delSld modSld sldOrd">
+      <pc:chgData name="alec daalman" userId="7bf6d2f418bbb9e9" providerId="LiveId" clId="{69E30B14-3982-47BF-9822-8905AF8B16C5}" dt="2022-10-17T09:24:09.978" v="1204" actId="13926"/>
       <pc:docMkLst>
         <pc:docMk/>
       </pc:docMkLst>
@@ -443,13 +445,13 @@
         </pc:picChg>
       </pc:sldChg>
       <pc:sldChg chg="addSp delSp modSp new mod">
-        <pc:chgData name="alec daalman" userId="7bf6d2f418bbb9e9" providerId="LiveId" clId="{69E30B14-3982-47BF-9822-8905AF8B16C5}" dt="2022-10-13T10:21:31.420" v="928" actId="1076"/>
+        <pc:chgData name="alec daalman" userId="7bf6d2f418bbb9e9" providerId="LiveId" clId="{69E30B14-3982-47BF-9822-8905AF8B16C5}" dt="2022-10-14T13:04:13.662" v="993" actId="20577"/>
         <pc:sldMkLst>
           <pc:docMk/>
           <pc:sldMk cId="435781075" sldId="274"/>
         </pc:sldMkLst>
         <pc:spChg chg="mod">
-          <ac:chgData name="alec daalman" userId="7bf6d2f418bbb9e9" providerId="LiveId" clId="{69E30B14-3982-47BF-9822-8905AF8B16C5}" dt="2022-10-13T10:19:48.687" v="916" actId="5793"/>
+          <ac:chgData name="alec daalman" userId="7bf6d2f418bbb9e9" providerId="LiveId" clId="{69E30B14-3982-47BF-9822-8905AF8B16C5}" dt="2022-10-14T13:04:13.662" v="993" actId="20577"/>
           <ac:spMkLst>
             <pc:docMk/>
             <pc:sldMk cId="435781075" sldId="274"/>
@@ -489,19 +491,193 @@
           </ac:picMkLst>
         </pc:picChg>
       </pc:sldChg>
-      <pc:sldChg chg="new">
-        <pc:chgData name="alec daalman" userId="7bf6d2f418bbb9e9" providerId="LiveId" clId="{69E30B14-3982-47BF-9822-8905AF8B16C5}" dt="2022-10-13T10:21:50.087" v="929" actId="680"/>
+      <pc:sldChg chg="addSp delSp modSp new mod">
+        <pc:chgData name="alec daalman" userId="7bf6d2f418bbb9e9" providerId="LiveId" clId="{69E30B14-3982-47BF-9822-8905AF8B16C5}" dt="2022-10-14T13:04:08.510" v="992" actId="14826"/>
         <pc:sldMkLst>
           <pc:docMk/>
           <pc:sldMk cId="2248008149" sldId="275"/>
         </pc:sldMkLst>
+        <pc:spChg chg="mod">
+          <ac:chgData name="alec daalman" userId="7bf6d2f418bbb9e9" providerId="LiveId" clId="{69E30B14-3982-47BF-9822-8905AF8B16C5}" dt="2022-10-14T12:59:45.600" v="942" actId="20577"/>
+          <ac:spMkLst>
+            <pc:docMk/>
+            <pc:sldMk cId="2248008149" sldId="275"/>
+            <ac:spMk id="2" creationId="{CA5A9EFF-A388-6EFF-0963-0A6351819D12}"/>
+          </ac:spMkLst>
+        </pc:spChg>
+        <pc:spChg chg="del">
+          <ac:chgData name="alec daalman" userId="7bf6d2f418bbb9e9" providerId="LiveId" clId="{69E30B14-3982-47BF-9822-8905AF8B16C5}" dt="2022-10-14T12:58:27.632" v="931" actId="22"/>
+          <ac:spMkLst>
+            <pc:docMk/>
+            <pc:sldMk cId="2248008149" sldId="275"/>
+            <ac:spMk id="3" creationId="{999131AD-410A-F0EE-4C9A-02411DA75E63}"/>
+          </ac:spMkLst>
+        </pc:spChg>
+        <pc:spChg chg="add del mod">
+          <ac:chgData name="alec daalman" userId="7bf6d2f418bbb9e9" providerId="LiveId" clId="{69E30B14-3982-47BF-9822-8905AF8B16C5}" dt="2022-10-14T12:59:36.863" v="940" actId="22"/>
+          <ac:spMkLst>
+            <pc:docMk/>
+            <pc:sldMk cId="2248008149" sldId="275"/>
+            <ac:spMk id="7" creationId="{0DD5504C-A44E-800B-0B18-906FA164063F}"/>
+          </ac:spMkLst>
+        </pc:spChg>
+        <pc:spChg chg="add mod">
+          <ac:chgData name="alec daalman" userId="7bf6d2f418bbb9e9" providerId="LiveId" clId="{69E30B14-3982-47BF-9822-8905AF8B16C5}" dt="2022-10-14T13:01:05.524" v="982" actId="1036"/>
+          <ac:spMkLst>
+            <pc:docMk/>
+            <pc:sldMk cId="2248008149" sldId="275"/>
+            <ac:spMk id="11" creationId="{F23C8258-42A6-B612-4D6F-8C5E853932A2}"/>
+          </ac:spMkLst>
+        </pc:spChg>
+        <pc:picChg chg="add del mod ord">
+          <ac:chgData name="alec daalman" userId="7bf6d2f418bbb9e9" providerId="LiveId" clId="{69E30B14-3982-47BF-9822-8905AF8B16C5}" dt="2022-10-14T12:59:07.535" v="939" actId="478"/>
+          <ac:picMkLst>
+            <pc:docMk/>
+            <pc:sldMk cId="2248008149" sldId="275"/>
+            <ac:picMk id="5" creationId="{03B4A0D7-028C-80D5-C549-4EA28C3CA167}"/>
+          </ac:picMkLst>
+        </pc:picChg>
+        <pc:picChg chg="add mod ord">
+          <ac:chgData name="alec daalman" userId="7bf6d2f418bbb9e9" providerId="LiveId" clId="{69E30B14-3982-47BF-9822-8905AF8B16C5}" dt="2022-10-14T13:01:05.524" v="982" actId="1036"/>
+          <ac:picMkLst>
+            <pc:docMk/>
+            <pc:sldMk cId="2248008149" sldId="275"/>
+            <ac:picMk id="9" creationId="{4D530A54-A6A5-B58C-F176-6C162D4BE911}"/>
+          </ac:picMkLst>
+        </pc:picChg>
+        <pc:picChg chg="add mod">
+          <ac:chgData name="alec daalman" userId="7bf6d2f418bbb9e9" providerId="LiveId" clId="{69E30B14-3982-47BF-9822-8905AF8B16C5}" dt="2022-10-14T13:04:08.510" v="992" actId="14826"/>
+          <ac:picMkLst>
+            <pc:docMk/>
+            <pc:sldMk cId="2248008149" sldId="275"/>
+            <ac:picMk id="10" creationId="{2BD70FAF-9A89-AA97-2CA8-B51AED42D627}"/>
+          </ac:picMkLst>
+        </pc:picChg>
       </pc:sldChg>
-      <pc:sldChg chg="new">
-        <pc:chgData name="alec daalman" userId="7bf6d2f418bbb9e9" providerId="LiveId" clId="{69E30B14-3982-47BF-9822-8905AF8B16C5}" dt="2022-10-13T10:21:50.805" v="930" actId="680"/>
+      <pc:sldChg chg="addSp delSp modSp new mod">
+        <pc:chgData name="alec daalman" userId="7bf6d2f418bbb9e9" providerId="LiveId" clId="{69E30B14-3982-47BF-9822-8905AF8B16C5}" dt="2022-10-14T13:02:33.896" v="986" actId="14826"/>
         <pc:sldMkLst>
           <pc:docMk/>
           <pc:sldMk cId="3168246759" sldId="276"/>
         </pc:sldMkLst>
+        <pc:spChg chg="mod">
+          <ac:chgData name="alec daalman" userId="7bf6d2f418bbb9e9" providerId="LiveId" clId="{69E30B14-3982-47BF-9822-8905AF8B16C5}" dt="2022-10-14T13:01:19.535" v="983"/>
+          <ac:spMkLst>
+            <pc:docMk/>
+            <pc:sldMk cId="3168246759" sldId="276"/>
+            <ac:spMk id="2" creationId="{45EA2E2E-AD34-982A-3127-79C89E6C6860}"/>
+          </ac:spMkLst>
+        </pc:spChg>
+        <pc:spChg chg="del mod">
+          <ac:chgData name="alec daalman" userId="7bf6d2f418bbb9e9" providerId="LiveId" clId="{69E30B14-3982-47BF-9822-8905AF8B16C5}" dt="2022-10-14T13:00:55.834" v="957" actId="478"/>
+          <ac:spMkLst>
+            <pc:docMk/>
+            <pc:sldMk cId="3168246759" sldId="276"/>
+            <ac:spMk id="3" creationId="{27B83B2A-C30B-C4F0-6957-C8365D85879C}"/>
+          </ac:spMkLst>
+        </pc:spChg>
+        <pc:spChg chg="add mod">
+          <ac:chgData name="alec daalman" userId="7bf6d2f418bbb9e9" providerId="LiveId" clId="{69E30B14-3982-47BF-9822-8905AF8B16C5}" dt="2022-10-14T13:00:47.836" v="955" actId="1076"/>
+          <ac:spMkLst>
+            <pc:docMk/>
+            <pc:sldMk cId="3168246759" sldId="276"/>
+            <ac:spMk id="6" creationId="{12BFAA2B-4F31-204C-5594-C974B2261953}"/>
+          </ac:spMkLst>
+        </pc:spChg>
+        <pc:picChg chg="add mod">
+          <ac:chgData name="alec daalman" userId="7bf6d2f418bbb9e9" providerId="LiveId" clId="{69E30B14-3982-47BF-9822-8905AF8B16C5}" dt="2022-10-14T13:02:24.280" v="984" actId="14826"/>
+          <ac:picMkLst>
+            <pc:docMk/>
+            <pc:sldMk cId="3168246759" sldId="276"/>
+            <ac:picMk id="4" creationId="{851418F7-4326-ABDE-4662-48EFFA500632}"/>
+          </ac:picMkLst>
+        </pc:picChg>
+        <pc:picChg chg="add mod">
+          <ac:chgData name="alec daalman" userId="7bf6d2f418bbb9e9" providerId="LiveId" clId="{69E30B14-3982-47BF-9822-8905AF8B16C5}" dt="2022-10-14T13:02:33.896" v="986" actId="14826"/>
+          <ac:picMkLst>
+            <pc:docMk/>
+            <pc:sldMk cId="3168246759" sldId="276"/>
+            <ac:picMk id="5" creationId="{B0E18779-745E-2071-D637-475A87538D15}"/>
+          </ac:picMkLst>
+        </pc:picChg>
+      </pc:sldChg>
+      <pc:sldChg chg="addSp delSp modSp new mod">
+        <pc:chgData name="alec daalman" userId="7bf6d2f418bbb9e9" providerId="LiveId" clId="{69E30B14-3982-47BF-9822-8905AF8B16C5}" dt="2022-10-14T13:03:43.613" v="991" actId="14826"/>
+        <pc:sldMkLst>
+          <pc:docMk/>
+          <pc:sldMk cId="389747750" sldId="277"/>
+        </pc:sldMkLst>
+        <pc:spChg chg="mod">
+          <ac:chgData name="alec daalman" userId="7bf6d2f418bbb9e9" providerId="LiveId" clId="{69E30B14-3982-47BF-9822-8905AF8B16C5}" dt="2022-10-14T13:02:55.203" v="990"/>
+          <ac:spMkLst>
+            <pc:docMk/>
+            <pc:sldMk cId="389747750" sldId="277"/>
+            <ac:spMk id="2" creationId="{D8A74138-1AE5-79AE-9249-C301CB3BBD47}"/>
+          </ac:spMkLst>
+        </pc:spChg>
+        <pc:spChg chg="del">
+          <ac:chgData name="alec daalman" userId="7bf6d2f418bbb9e9" providerId="LiveId" clId="{69E30B14-3982-47BF-9822-8905AF8B16C5}" dt="2022-10-14T13:02:46.709" v="989" actId="478"/>
+          <ac:spMkLst>
+            <pc:docMk/>
+            <pc:sldMk cId="389747750" sldId="277"/>
+            <ac:spMk id="3" creationId="{808CAF88-B6F6-9EB8-B554-2668B4B9C94C}"/>
+          </ac:spMkLst>
+        </pc:spChg>
+        <pc:spChg chg="add mod">
+          <ac:chgData name="alec daalman" userId="7bf6d2f418bbb9e9" providerId="LiveId" clId="{69E30B14-3982-47BF-9822-8905AF8B16C5}" dt="2022-10-14T13:02:41.549" v="988"/>
+          <ac:spMkLst>
+            <pc:docMk/>
+            <pc:sldMk cId="389747750" sldId="277"/>
+            <ac:spMk id="6" creationId="{F0C5C9BF-7433-B12F-AF34-66C9504308CB}"/>
+          </ac:spMkLst>
+        </pc:spChg>
+        <pc:picChg chg="add mod">
+          <ac:chgData name="alec daalman" userId="7bf6d2f418bbb9e9" providerId="LiveId" clId="{69E30B14-3982-47BF-9822-8905AF8B16C5}" dt="2022-10-14T13:03:43.613" v="991" actId="14826"/>
+          <ac:picMkLst>
+            <pc:docMk/>
+            <pc:sldMk cId="389747750" sldId="277"/>
+            <ac:picMk id="4" creationId="{6FD47F7B-07E4-1CFF-E53E-83B79AB643F5}"/>
+          </ac:picMkLst>
+        </pc:picChg>
+        <pc:picChg chg="add mod">
+          <ac:chgData name="alec daalman" userId="7bf6d2f418bbb9e9" providerId="LiveId" clId="{69E30B14-3982-47BF-9822-8905AF8B16C5}" dt="2022-10-14T13:02:41.549" v="988"/>
+          <ac:picMkLst>
+            <pc:docMk/>
+            <pc:sldMk cId="389747750" sldId="277"/>
+            <ac:picMk id="5" creationId="{73704475-1F48-811B-B546-1AE7C86337A0}"/>
+          </ac:picMkLst>
+        </pc:picChg>
+      </pc:sldChg>
+      <pc:sldChg chg="modSp add mod ord">
+        <pc:chgData name="alec daalman" userId="7bf6d2f418bbb9e9" providerId="LiveId" clId="{69E30B14-3982-47BF-9822-8905AF8B16C5}" dt="2022-10-17T09:24:09.978" v="1204" actId="13926"/>
+        <pc:sldMkLst>
+          <pc:docMk/>
+          <pc:sldMk cId="4085102920" sldId="278"/>
+        </pc:sldMkLst>
+        <pc:spChg chg="mod">
+          <ac:chgData name="alec daalman" userId="7bf6d2f418bbb9e9" providerId="LiveId" clId="{69E30B14-3982-47BF-9822-8905AF8B16C5}" dt="2022-10-14T15:56:29.390" v="1019" actId="20577"/>
+          <ac:spMkLst>
+            <pc:docMk/>
+            <pc:sldMk cId="4085102920" sldId="278"/>
+            <ac:spMk id="2" creationId="{05CDA219-E683-2F5E-6EBB-10B29CE46A9E}"/>
+          </ac:spMkLst>
+        </pc:spChg>
+        <pc:spChg chg="mod">
+          <ac:chgData name="alec daalman" userId="7bf6d2f418bbb9e9" providerId="LiveId" clId="{69E30B14-3982-47BF-9822-8905AF8B16C5}" dt="2022-10-14T17:22:55.766" v="1202" actId="27636"/>
+          <ac:spMkLst>
+            <pc:docMk/>
+            <pc:sldMk cId="4085102920" sldId="278"/>
+            <ac:spMk id="4" creationId="{6D7228DF-1806-51B0-95C8-07010641A4A4}"/>
+          </ac:spMkLst>
+        </pc:spChg>
+        <pc:spChg chg="mod">
+          <ac:chgData name="alec daalman" userId="7bf6d2f418bbb9e9" providerId="LiveId" clId="{69E30B14-3982-47BF-9822-8905AF8B16C5}" dt="2022-10-17T09:24:09.978" v="1204" actId="13926"/>
+          <ac:spMkLst>
+            <pc:docMk/>
+            <pc:sldMk cId="4085102920" sldId="278"/>
+            <ac:spMk id="5" creationId="{A32BE88F-B080-4661-00B8-655D7D39FB67}"/>
+          </ac:spMkLst>
+        </pc:spChg>
       </pc:sldChg>
     </pc:docChg>
   </pc:docChgLst>
@@ -5192,7 +5368,7 @@
           <a:p>
             <a:fld id="{A678E496-5755-4B61-A05D-8100C233ACE9}" type="datetimeFigureOut">
               <a:rPr lang="nl-NL" smtClean="0"/>
-              <a:t>13-10-2022</a:t>
+              <a:t>14-10-2022</a:t>
             </a:fld>
             <a:endParaRPr lang="nl-NL"/>
           </a:p>
@@ -5390,7 +5566,7 @@
           <a:p>
             <a:fld id="{A678E496-5755-4B61-A05D-8100C233ACE9}" type="datetimeFigureOut">
               <a:rPr lang="nl-NL" smtClean="0"/>
-              <a:t>13-10-2022</a:t>
+              <a:t>14-10-2022</a:t>
             </a:fld>
             <a:endParaRPr lang="nl-NL"/>
           </a:p>
@@ -5598,7 +5774,7 @@
           <a:p>
             <a:fld id="{A678E496-5755-4B61-A05D-8100C233ACE9}" type="datetimeFigureOut">
               <a:rPr lang="nl-NL" smtClean="0"/>
-              <a:t>13-10-2022</a:t>
+              <a:t>14-10-2022</a:t>
             </a:fld>
             <a:endParaRPr lang="nl-NL"/>
           </a:p>
@@ -5796,7 +5972,7 @@
           <a:p>
             <a:fld id="{A678E496-5755-4B61-A05D-8100C233ACE9}" type="datetimeFigureOut">
               <a:rPr lang="nl-NL" smtClean="0"/>
-              <a:t>13-10-2022</a:t>
+              <a:t>14-10-2022</a:t>
             </a:fld>
             <a:endParaRPr lang="nl-NL"/>
           </a:p>
@@ -6071,7 +6247,7 @@
           <a:p>
             <a:fld id="{A678E496-5755-4B61-A05D-8100C233ACE9}" type="datetimeFigureOut">
               <a:rPr lang="nl-NL" smtClean="0"/>
-              <a:t>13-10-2022</a:t>
+              <a:t>14-10-2022</a:t>
             </a:fld>
             <a:endParaRPr lang="nl-NL"/>
           </a:p>
@@ -6336,7 +6512,7 @@
           <a:p>
             <a:fld id="{A678E496-5755-4B61-A05D-8100C233ACE9}" type="datetimeFigureOut">
               <a:rPr lang="nl-NL" smtClean="0"/>
-              <a:t>13-10-2022</a:t>
+              <a:t>14-10-2022</a:t>
             </a:fld>
             <a:endParaRPr lang="nl-NL"/>
           </a:p>
@@ -6748,7 +6924,7 @@
           <a:p>
             <a:fld id="{A678E496-5755-4B61-A05D-8100C233ACE9}" type="datetimeFigureOut">
               <a:rPr lang="nl-NL" smtClean="0"/>
-              <a:t>13-10-2022</a:t>
+              <a:t>14-10-2022</a:t>
             </a:fld>
             <a:endParaRPr lang="nl-NL"/>
           </a:p>
@@ -6889,7 +7065,7 @@
           <a:p>
             <a:fld id="{A678E496-5755-4B61-A05D-8100C233ACE9}" type="datetimeFigureOut">
               <a:rPr lang="nl-NL" smtClean="0"/>
-              <a:t>13-10-2022</a:t>
+              <a:t>14-10-2022</a:t>
             </a:fld>
             <a:endParaRPr lang="nl-NL"/>
           </a:p>
@@ -7002,7 +7178,7 @@
           <a:p>
             <a:fld id="{A678E496-5755-4B61-A05D-8100C233ACE9}" type="datetimeFigureOut">
               <a:rPr lang="nl-NL" smtClean="0"/>
-              <a:t>13-10-2022</a:t>
+              <a:t>14-10-2022</a:t>
             </a:fld>
             <a:endParaRPr lang="nl-NL"/>
           </a:p>
@@ -7313,7 +7489,7 @@
           <a:p>
             <a:fld id="{A678E496-5755-4B61-A05D-8100C233ACE9}" type="datetimeFigureOut">
               <a:rPr lang="nl-NL" smtClean="0"/>
-              <a:t>13-10-2022</a:t>
+              <a:t>14-10-2022</a:t>
             </a:fld>
             <a:endParaRPr lang="nl-NL"/>
           </a:p>
@@ -7601,7 +7777,7 @@
           <a:p>
             <a:fld id="{A678E496-5755-4B61-A05D-8100C233ACE9}" type="datetimeFigureOut">
               <a:rPr lang="nl-NL" smtClean="0"/>
-              <a:t>13-10-2022</a:t>
+              <a:t>14-10-2022</a:t>
             </a:fld>
             <a:endParaRPr lang="nl-NL"/>
           </a:p>
@@ -7842,7 +8018,7 @@
           <a:p>
             <a:fld id="{A678E496-5755-4B61-A05D-8100C233ACE9}" type="datetimeFigureOut">
               <a:rPr lang="nl-NL" smtClean="0"/>
-              <a:t>13-10-2022</a:t>
+              <a:t>14-10-2022</a:t>
             </a:fld>
             <a:endParaRPr lang="nl-NL"/>
           </a:p>
@@ -9967,10 +10143,9 @@
               <a:t>nodes</a:t>
             </a:r>
             <a:r>
-              <a:rPr lang="nl-NL"/>
+              <a:rPr lang="nl-NL" dirty="0"/>
               <a:t> state</a:t>
             </a:r>
-            <a:endParaRPr lang="nl-NL" dirty="0"/>
           </a:p>
         </p:txBody>
       </p:sp>
@@ -10059,7 +10234,7 @@
           <a:p>
             <a:r>
               <a:rPr lang="nl-NL" dirty="0"/>
-              <a:t>Update (4-10-2022) </a:t>
+              <a:t>Update (14-10-2022) </a:t>
             </a:r>
             <a:r>
               <a:rPr lang="nl-NL" dirty="0" err="1"/>
@@ -10236,31 +10411,127 @@
           <a:bodyPr/>
           <a:lstStyle/>
           <a:p>
-            <a:endParaRPr lang="nl-NL"/>
+            <a:r>
+              <a:rPr lang="nl-NL" dirty="0"/>
+              <a:t>ADome GUI </a:t>
+            </a:r>
+            <a:r>
+              <a:rPr lang="nl-NL" dirty="0" err="1"/>
+              <a:t>normal</a:t>
+            </a:r>
+            <a:r>
+              <a:rPr lang="nl-NL" dirty="0"/>
+              <a:t> state</a:t>
+            </a:r>
           </a:p>
         </p:txBody>
       </p:sp>
-      <p:sp>
-        <p:nvSpPr>
-          <p:cNvPr id="3" name="Tijdelijke aanduiding voor inhoud 2">
+      <p:pic>
+        <p:nvPicPr>
+          <p:cNvPr id="9" name="Tijdelijke aanduiding voor inhoud 8">
             <a:extLst>
               <a:ext uri="{FF2B5EF4-FFF2-40B4-BE49-F238E27FC236}">
-                <a16:creationId xmlns:a16="http://schemas.microsoft.com/office/drawing/2014/main" id="{999131AD-410A-F0EE-4C9A-02411DA75E63}"/>
+                <a16:creationId xmlns:a16="http://schemas.microsoft.com/office/drawing/2014/main" id="{4D530A54-A6A5-B58C-F176-6C162D4BE911}"/>
               </a:ext>
             </a:extLst>
           </p:cNvPr>
-          <p:cNvSpPr>
-            <a:spLocks noGrp="1"/>
-          </p:cNvSpPr>
+          <p:cNvPicPr>
+            <a:picLocks noGrp="1" noChangeAspect="1"/>
+          </p:cNvPicPr>
           <p:nvPr>
             <p:ph idx="1"/>
           </p:nvPr>
+        </p:nvPicPr>
+        <p:blipFill>
+          <a:blip r:embed="rId2"/>
+          <a:stretch>
+            <a:fillRect/>
+          </a:stretch>
+        </p:blipFill>
+        <p:spPr>
+          <a:xfrm>
+            <a:off x="6615283" y="1717581"/>
+            <a:ext cx="4738516" cy="3733737"/>
+          </a:xfrm>
+        </p:spPr>
+      </p:pic>
+      <p:pic>
+        <p:nvPicPr>
+          <p:cNvPr id="10" name="Tijdelijke aanduiding voor inhoud 4">
+            <a:extLst>
+              <a:ext uri="{FF2B5EF4-FFF2-40B4-BE49-F238E27FC236}">
+                <a16:creationId xmlns:a16="http://schemas.microsoft.com/office/drawing/2014/main" id="{2BD70FAF-9A89-AA97-2CA8-B51AED42D627}"/>
+              </a:ext>
+            </a:extLst>
+          </p:cNvPr>
+          <p:cNvPicPr>
+            <a:picLocks noChangeAspect="1"/>
+          </p:cNvPicPr>
+          <p:nvPr/>
+        </p:nvPicPr>
+        <p:blipFill>
+          <a:blip r:embed="rId3">
+            <a:extLst>
+              <a:ext uri="{28A0092B-C50C-407E-A947-70E740481C1C}">
+                <a14:useLocalDpi xmlns:a14="http://schemas.microsoft.com/office/drawing/2010/main" val="0"/>
+              </a:ext>
+            </a:extLst>
+          </a:blip>
+          <a:srcRect/>
+          <a:stretch/>
+        </p:blipFill>
+        <p:spPr>
+          <a:xfrm>
+            <a:off x="852875" y="1810712"/>
+            <a:ext cx="4563505" cy="3640606"/>
+          </a:xfrm>
+          <a:prstGeom prst="rect">
+            <a:avLst/>
+          </a:prstGeom>
+        </p:spPr>
+      </p:pic>
+      <p:sp>
+        <p:nvSpPr>
+          <p:cNvPr id="11" name="Pijl: rechts 10">
+            <a:extLst>
+              <a:ext uri="{FF2B5EF4-FFF2-40B4-BE49-F238E27FC236}">
+                <a16:creationId xmlns:a16="http://schemas.microsoft.com/office/drawing/2014/main" id="{F23C8258-42A6-B612-4D6F-8C5E853932A2}"/>
+              </a:ext>
+            </a:extLst>
+          </p:cNvPr>
+          <p:cNvSpPr/>
+          <p:nvPr/>
         </p:nvSpPr>
-        <p:spPr/>
+        <p:spPr>
+          <a:xfrm>
+            <a:off x="5767526" y="3118371"/>
+            <a:ext cx="656948" cy="932155"/>
+          </a:xfrm>
+          <a:prstGeom prst="rightArrow">
+            <a:avLst/>
+          </a:prstGeom>
+        </p:spPr>
+        <p:style>
+          <a:lnRef idx="2">
+            <a:schemeClr val="dk1">
+              <a:shade val="50000"/>
+            </a:schemeClr>
+          </a:lnRef>
+          <a:fillRef idx="1">
+            <a:schemeClr val="dk1"/>
+          </a:fillRef>
+          <a:effectRef idx="0">
+            <a:schemeClr val="dk1"/>
+          </a:effectRef>
+          <a:fontRef idx="minor">
+            <a:schemeClr val="lt1"/>
+          </a:fontRef>
+        </p:style>
         <p:txBody>
-          <a:bodyPr/>
+          <a:bodyPr rtlCol="0" anchor="ctr"/>
           <a:lstStyle/>
           <a:p>
+            <a:pPr algn="ctr"/>
             <a:endParaRPr lang="nl-NL"/>
           </a:p>
         </p:txBody>
@@ -10316,16 +10587,173 @@
           <a:bodyPr/>
           <a:lstStyle/>
           <a:p>
-            <a:endParaRPr lang="nl-NL"/>
+            <a:r>
+              <a:rPr lang="nl-NL" dirty="0"/>
+              <a:t>ADome GUI list of </a:t>
+            </a:r>
+            <a:r>
+              <a:rPr lang="nl-NL" dirty="0" err="1"/>
+              <a:t>coordinates</a:t>
+            </a:r>
+            <a:r>
+              <a:rPr lang="nl-NL" dirty="0"/>
+              <a:t> state</a:t>
+            </a:r>
           </a:p>
         </p:txBody>
       </p:sp>
+      <p:pic>
+        <p:nvPicPr>
+          <p:cNvPr id="4" name="Tijdelijke aanduiding voor inhoud 8">
+            <a:extLst>
+              <a:ext uri="{FF2B5EF4-FFF2-40B4-BE49-F238E27FC236}">
+                <a16:creationId xmlns:a16="http://schemas.microsoft.com/office/drawing/2014/main" id="{851418F7-4326-ABDE-4662-48EFFA500632}"/>
+              </a:ext>
+            </a:extLst>
+          </p:cNvPr>
+          <p:cNvPicPr>
+            <a:picLocks noChangeAspect="1"/>
+          </p:cNvPicPr>
+          <p:nvPr/>
+        </p:nvPicPr>
+        <p:blipFill>
+          <a:blip r:embed="rId2">
+            <a:extLst>
+              <a:ext uri="{28A0092B-C50C-407E-A947-70E740481C1C}">
+                <a14:useLocalDpi xmlns:a14="http://schemas.microsoft.com/office/drawing/2010/main" val="0"/>
+              </a:ext>
+            </a:extLst>
+          </a:blip>
+          <a:srcRect/>
+          <a:stretch/>
+        </p:blipFill>
+        <p:spPr>
+          <a:xfrm>
+            <a:off x="6628872" y="2205846"/>
+            <a:ext cx="4711340" cy="3733737"/>
+          </a:xfrm>
+          <a:prstGeom prst="rect">
+            <a:avLst/>
+          </a:prstGeom>
+        </p:spPr>
+      </p:pic>
+      <p:pic>
+        <p:nvPicPr>
+          <p:cNvPr id="5" name="Tijdelijke aanduiding voor inhoud 4">
+            <a:extLst>
+              <a:ext uri="{FF2B5EF4-FFF2-40B4-BE49-F238E27FC236}">
+                <a16:creationId xmlns:a16="http://schemas.microsoft.com/office/drawing/2014/main" id="{B0E18779-745E-2071-D637-475A87538D15}"/>
+              </a:ext>
+            </a:extLst>
+          </p:cNvPr>
+          <p:cNvPicPr>
+            <a:picLocks noChangeAspect="1"/>
+          </p:cNvPicPr>
+          <p:nvPr/>
+        </p:nvPicPr>
+        <p:blipFill>
+          <a:blip r:embed="rId3">
+            <a:extLst>
+              <a:ext uri="{28A0092B-C50C-407E-A947-70E740481C1C}">
+                <a14:useLocalDpi xmlns:a14="http://schemas.microsoft.com/office/drawing/2010/main" val="0"/>
+              </a:ext>
+            </a:extLst>
+          </a:blip>
+          <a:srcRect/>
+          <a:stretch/>
+        </p:blipFill>
+        <p:spPr>
+          <a:xfrm>
+            <a:off x="838200" y="2327314"/>
+            <a:ext cx="4592854" cy="3583932"/>
+          </a:xfrm>
+          <a:prstGeom prst="rect">
+            <a:avLst/>
+          </a:prstGeom>
+        </p:spPr>
+      </p:pic>
       <p:sp>
         <p:nvSpPr>
-          <p:cNvPr id="3" name="Tijdelijke aanduiding voor inhoud 2">
+          <p:cNvPr id="6" name="Pijl: rechts 5">
             <a:extLst>
               <a:ext uri="{FF2B5EF4-FFF2-40B4-BE49-F238E27FC236}">
-                <a16:creationId xmlns:a16="http://schemas.microsoft.com/office/drawing/2014/main" id="{27B83B2A-C30B-C4F0-6957-C8365D85879C}"/>
+                <a16:creationId xmlns:a16="http://schemas.microsoft.com/office/drawing/2014/main" id="{12BFAA2B-4F31-204C-5594-C974B2261953}"/>
+              </a:ext>
+            </a:extLst>
+          </p:cNvPr>
+          <p:cNvSpPr/>
+          <p:nvPr/>
+        </p:nvSpPr>
+        <p:spPr>
+          <a:xfrm>
+            <a:off x="5767527" y="3606636"/>
+            <a:ext cx="656948" cy="932155"/>
+          </a:xfrm>
+          <a:prstGeom prst="rightArrow">
+            <a:avLst/>
+          </a:prstGeom>
+        </p:spPr>
+        <p:style>
+          <a:lnRef idx="2">
+            <a:schemeClr val="dk1">
+              <a:shade val="50000"/>
+            </a:schemeClr>
+          </a:lnRef>
+          <a:fillRef idx="1">
+            <a:schemeClr val="dk1"/>
+          </a:fillRef>
+          <a:effectRef idx="0">
+            <a:schemeClr val="dk1"/>
+          </a:effectRef>
+          <a:fontRef idx="minor">
+            <a:schemeClr val="lt1"/>
+          </a:fontRef>
+        </p:style>
+        <p:txBody>
+          <a:bodyPr rtlCol="0" anchor="ctr"/>
+          <a:lstStyle/>
+          <a:p>
+            <a:pPr algn="ctr"/>
+            <a:endParaRPr lang="nl-NL"/>
+          </a:p>
+        </p:txBody>
+      </p:sp>
+    </p:spTree>
+    <p:extLst>
+      <p:ext uri="{BB962C8B-B14F-4D97-AF65-F5344CB8AC3E}">
+        <p14:creationId xmlns:p14="http://schemas.microsoft.com/office/powerpoint/2010/main" val="3168246759"/>
+      </p:ext>
+    </p:extLst>
+  </p:cSld>
+  <p:clrMapOvr>
+    <a:masterClrMapping/>
+  </p:clrMapOvr>
+</p:sld>
+</file>
+
+<file path=ppt/slides/slide19.xml><?xml version="1.0" encoding="utf-8"?>
+<p:sld xmlns:a="http://schemas.openxmlformats.org/drawingml/2006/main" xmlns:r="http://schemas.openxmlformats.org/officeDocument/2006/relationships" xmlns:p="http://schemas.openxmlformats.org/presentationml/2006/main">
+  <p:cSld>
+    <p:spTree>
+      <p:nvGrpSpPr>
+        <p:cNvPr id="1" name=""/>
+        <p:cNvGrpSpPr/>
+        <p:nvPr/>
+      </p:nvGrpSpPr>
+      <p:grpSpPr>
+        <a:xfrm>
+          <a:off x="0" y="0"/>
+          <a:ext cx="0" cy="0"/>
+          <a:chOff x="0" y="0"/>
+          <a:chExt cx="0" cy="0"/>
+        </a:xfrm>
+      </p:grpSpPr>
+      <p:sp>
+        <p:nvSpPr>
+          <p:cNvPr id="2" name="Titel 1">
+            <a:extLst>
+              <a:ext uri="{FF2B5EF4-FFF2-40B4-BE49-F238E27FC236}">
+                <a16:creationId xmlns:a16="http://schemas.microsoft.com/office/drawing/2014/main" id="{D8A74138-1AE5-79AE-9249-C301CB3BBD47}"/>
               </a:ext>
             </a:extLst>
           </p:cNvPr>
@@ -10333,7 +10761,7 @@
             <a:spLocks noGrp="1"/>
           </p:cNvSpPr>
           <p:nvPr>
-            <p:ph idx="1"/>
+            <p:ph type="title"/>
           </p:nvPr>
         </p:nvSpPr>
         <p:spPr/>
@@ -10341,6 +10769,141 @@
           <a:bodyPr/>
           <a:lstStyle/>
           <a:p>
+            <a:r>
+              <a:rPr lang="nl-NL" dirty="0"/>
+              <a:t>ADome GUI </a:t>
+            </a:r>
+            <a:r>
+              <a:rPr lang="nl-NL" dirty="0" err="1"/>
+              <a:t>visualize</a:t>
+            </a:r>
+            <a:r>
+              <a:rPr lang="nl-NL" dirty="0"/>
+              <a:t> </a:t>
+            </a:r>
+            <a:r>
+              <a:rPr lang="nl-NL" dirty="0" err="1"/>
+              <a:t>nodes</a:t>
+            </a:r>
+            <a:r>
+              <a:rPr lang="nl-NL" dirty="0"/>
+              <a:t> state</a:t>
+            </a:r>
+          </a:p>
+        </p:txBody>
+      </p:sp>
+      <p:pic>
+        <p:nvPicPr>
+          <p:cNvPr id="4" name="Tijdelijke aanduiding voor inhoud 8">
+            <a:extLst>
+              <a:ext uri="{FF2B5EF4-FFF2-40B4-BE49-F238E27FC236}">
+                <a16:creationId xmlns:a16="http://schemas.microsoft.com/office/drawing/2014/main" id="{6FD47F7B-07E4-1CFF-E53E-83B79AB643F5}"/>
+              </a:ext>
+            </a:extLst>
+          </p:cNvPr>
+          <p:cNvPicPr>
+            <a:picLocks noChangeAspect="1"/>
+          </p:cNvPicPr>
+          <p:nvPr/>
+        </p:nvPicPr>
+        <p:blipFill>
+          <a:blip r:embed="rId2">
+            <a:extLst>
+              <a:ext uri="{28A0092B-C50C-407E-A947-70E740481C1C}">
+                <a14:useLocalDpi xmlns:a14="http://schemas.microsoft.com/office/drawing/2010/main" val="0"/>
+              </a:ext>
+            </a:extLst>
+          </a:blip>
+          <a:srcRect/>
+          <a:stretch/>
+        </p:blipFill>
+        <p:spPr>
+          <a:xfrm>
+            <a:off x="6637036" y="2205846"/>
+            <a:ext cx="4695012" cy="3733737"/>
+          </a:xfrm>
+          <a:prstGeom prst="rect">
+            <a:avLst/>
+          </a:prstGeom>
+        </p:spPr>
+      </p:pic>
+      <p:pic>
+        <p:nvPicPr>
+          <p:cNvPr id="5" name="Tijdelijke aanduiding voor inhoud 4">
+            <a:extLst>
+              <a:ext uri="{FF2B5EF4-FFF2-40B4-BE49-F238E27FC236}">
+                <a16:creationId xmlns:a16="http://schemas.microsoft.com/office/drawing/2014/main" id="{73704475-1F48-811B-B546-1AE7C86337A0}"/>
+              </a:ext>
+            </a:extLst>
+          </p:cNvPr>
+          <p:cNvPicPr>
+            <a:picLocks noChangeAspect="1"/>
+          </p:cNvPicPr>
+          <p:nvPr/>
+        </p:nvPicPr>
+        <p:blipFill>
+          <a:blip r:embed="rId3">
+            <a:extLst>
+              <a:ext uri="{28A0092B-C50C-407E-A947-70E740481C1C}">
+                <a14:useLocalDpi xmlns:a14="http://schemas.microsoft.com/office/drawing/2010/main" val="0"/>
+              </a:ext>
+            </a:extLst>
+          </a:blip>
+          <a:srcRect/>
+          <a:stretch/>
+        </p:blipFill>
+        <p:spPr>
+          <a:xfrm>
+            <a:off x="838200" y="2327314"/>
+            <a:ext cx="4592854" cy="3583932"/>
+          </a:xfrm>
+          <a:prstGeom prst="rect">
+            <a:avLst/>
+          </a:prstGeom>
+        </p:spPr>
+      </p:pic>
+      <p:sp>
+        <p:nvSpPr>
+          <p:cNvPr id="6" name="Pijl: rechts 5">
+            <a:extLst>
+              <a:ext uri="{FF2B5EF4-FFF2-40B4-BE49-F238E27FC236}">
+                <a16:creationId xmlns:a16="http://schemas.microsoft.com/office/drawing/2014/main" id="{F0C5C9BF-7433-B12F-AF34-66C9504308CB}"/>
+              </a:ext>
+            </a:extLst>
+          </p:cNvPr>
+          <p:cNvSpPr/>
+          <p:nvPr/>
+        </p:nvSpPr>
+        <p:spPr>
+          <a:xfrm>
+            <a:off x="5767527" y="3606636"/>
+            <a:ext cx="656948" cy="932155"/>
+          </a:xfrm>
+          <a:prstGeom prst="rightArrow">
+            <a:avLst/>
+          </a:prstGeom>
+        </p:spPr>
+        <p:style>
+          <a:lnRef idx="2">
+            <a:schemeClr val="dk1">
+              <a:shade val="50000"/>
+            </a:schemeClr>
+          </a:lnRef>
+          <a:fillRef idx="1">
+            <a:schemeClr val="dk1"/>
+          </a:fillRef>
+          <a:effectRef idx="0">
+            <a:schemeClr val="dk1"/>
+          </a:effectRef>
+          <a:fontRef idx="minor">
+            <a:schemeClr val="lt1"/>
+          </a:fontRef>
+        </p:style>
+        <p:txBody>
+          <a:bodyPr rtlCol="0" anchor="ctr"/>
+          <a:lstStyle/>
+          <a:p>
+            <a:pPr algn="ctr"/>
             <a:endParaRPr lang="nl-NL"/>
           </a:p>
         </p:txBody>
@@ -10348,7 +10911,7 @@
     </p:spTree>
     <p:extLst>
       <p:ext uri="{BB962C8B-B14F-4D97-AF65-F5344CB8AC3E}">
-        <p14:creationId xmlns:p14="http://schemas.microsoft.com/office/powerpoint/2010/main" val="3168246759"/>
+        <p14:creationId xmlns:p14="http://schemas.microsoft.com/office/powerpoint/2010/main" val="389747750"/>
       </p:ext>
     </p:extLst>
   </p:cSld>
@@ -10528,6 +11091,807 @@
     <p:extLst>
       <p:ext uri="{BB962C8B-B14F-4D97-AF65-F5344CB8AC3E}">
         <p14:creationId xmlns:p14="http://schemas.microsoft.com/office/powerpoint/2010/main" val="3181371701"/>
+      </p:ext>
+    </p:extLst>
+  </p:cSld>
+  <p:clrMapOvr>
+    <a:masterClrMapping/>
+  </p:clrMapOvr>
+</p:sld>
+</file>
+
+<file path=ppt/slides/slide20.xml><?xml version="1.0" encoding="utf-8"?>
+<p:sld xmlns:a="http://schemas.openxmlformats.org/drawingml/2006/main" xmlns:r="http://schemas.openxmlformats.org/officeDocument/2006/relationships" xmlns:p="http://schemas.openxmlformats.org/presentationml/2006/main">
+  <p:cSld>
+    <p:bg>
+      <p:bgPr>
+        <a:solidFill>
+          <a:schemeClr val="bg1"/>
+        </a:solidFill>
+        <a:effectLst/>
+      </p:bgPr>
+    </p:bg>
+    <p:spTree>
+      <p:nvGrpSpPr>
+        <p:cNvPr id="1" name=""/>
+        <p:cNvGrpSpPr/>
+        <p:nvPr/>
+      </p:nvGrpSpPr>
+      <p:grpSpPr>
+        <a:xfrm>
+          <a:off x="0" y="0"/>
+          <a:ext cx="0" cy="0"/>
+          <a:chOff x="0" y="0"/>
+          <a:chExt cx="0" cy="0"/>
+        </a:xfrm>
+      </p:grpSpPr>
+      <p:sp>
+        <p:nvSpPr>
+          <p:cNvPr id="10" name="Rectangle 9">
+            <a:extLst>
+              <a:ext uri="{FF2B5EF4-FFF2-40B4-BE49-F238E27FC236}">
+                <a16:creationId xmlns:a16="http://schemas.microsoft.com/office/drawing/2014/main" id="{4C608BEB-860E-4094-8511-78603564A75E}"/>
+              </a:ext>
+              <a:ext uri="{C183D7F6-B498-43B3-948B-1728B52AA6E4}">
+                <adec:decorative xmlns:adec="http://schemas.microsoft.com/office/drawing/2017/decorative" val="1"/>
+              </a:ext>
+            </a:extLst>
+          </p:cNvPr>
+          <p:cNvSpPr>
+            <a:spLocks noGrp="1" noRot="1" noChangeAspect="1" noMove="1" noResize="1" noEditPoints="1" noAdjustHandles="1" noChangeArrowheads="1" noChangeShapeType="1" noTextEdit="1"/>
+          </p:cNvSpPr>
+          <p:nvPr>
+            <p:extLst>
+              <p:ext uri="{386F3935-93C4-4BCD-93E2-E3B085C9AB24}">
+                <p16:designElem xmlns:p16="http://schemas.microsoft.com/office/powerpoint/2015/main" val="1"/>
+              </p:ext>
+            </p:extLst>
+          </p:nvPr>
+        </p:nvSpPr>
+        <p:spPr>
+          <a:xfrm>
+            <a:off x="0" y="0"/>
+            <a:ext cx="4059050" cy="6858000"/>
+          </a:xfrm>
+          <a:prstGeom prst="rect">
+            <a:avLst/>
+          </a:prstGeom>
+          <a:solidFill>
+            <a:srgbClr val="404040"/>
+          </a:solidFill>
+          <a:ln>
+            <a:noFill/>
+          </a:ln>
+        </p:spPr>
+        <p:style>
+          <a:lnRef idx="2">
+            <a:schemeClr val="accent1">
+              <a:shade val="50000"/>
+            </a:schemeClr>
+          </a:lnRef>
+          <a:fillRef idx="1">
+            <a:schemeClr val="accent1"/>
+          </a:fillRef>
+          <a:effectRef idx="0">
+            <a:schemeClr val="accent1"/>
+          </a:effectRef>
+          <a:fontRef idx="minor">
+            <a:schemeClr val="lt1"/>
+          </a:fontRef>
+        </p:style>
+        <p:txBody>
+          <a:bodyPr rtlCol="0" anchor="ctr"/>
+          <a:lstStyle/>
+          <a:p>
+            <a:pPr marL="0" marR="0" lvl="0" indent="0" algn="ctr" defTabSz="914400" rtl="0" eaLnBrk="1" fontAlgn="auto" latinLnBrk="0" hangingPunct="1">
+              <a:lnSpc>
+                <a:spcPct val="100000"/>
+              </a:lnSpc>
+              <a:spcBef>
+                <a:spcPts val="0"/>
+              </a:spcBef>
+              <a:spcAft>
+                <a:spcPts val="0"/>
+              </a:spcAft>
+              <a:buClrTx/>
+              <a:buSzTx/>
+              <a:buFontTx/>
+              <a:buNone/>
+              <a:tabLst/>
+              <a:defRPr/>
+            </a:pPr>
+            <a:endParaRPr kumimoji="0" lang="en-US" sz="1800" b="0" i="0" u="none" strike="noStrike" kern="1200" cap="none" spc="0" normalizeH="0" baseline="0" noProof="0">
+              <a:ln>
+                <a:noFill/>
+              </a:ln>
+              <a:solidFill>
+                <a:prstClr val="white"/>
+              </a:solidFill>
+              <a:effectLst/>
+              <a:uLnTx/>
+              <a:uFillTx/>
+              <a:latin typeface="Calibri" panose="020F0502020204030204"/>
+              <a:ea typeface="+mn-ea"/>
+              <a:cs typeface="+mn-cs"/>
+            </a:endParaRPr>
+          </a:p>
+        </p:txBody>
+      </p:sp>
+      <p:sp>
+        <p:nvSpPr>
+          <p:cNvPr id="2" name="Titel 1">
+            <a:extLst>
+              <a:ext uri="{FF2B5EF4-FFF2-40B4-BE49-F238E27FC236}">
+                <a16:creationId xmlns:a16="http://schemas.microsoft.com/office/drawing/2014/main" id="{05CDA219-E683-2F5E-6EBB-10B29CE46A9E}"/>
+              </a:ext>
+            </a:extLst>
+          </p:cNvPr>
+          <p:cNvSpPr>
+            <a:spLocks noGrp="1"/>
+          </p:cNvSpPr>
+          <p:nvPr>
+            <p:ph type="title"/>
+          </p:nvPr>
+        </p:nvSpPr>
+        <p:spPr>
+          <a:xfrm>
+            <a:off x="838200" y="1412488"/>
+            <a:ext cx="2899189" cy="4363844"/>
+          </a:xfrm>
+        </p:spPr>
+        <p:txBody>
+          <a:bodyPr anchor="t">
+            <a:normAutofit/>
+          </a:bodyPr>
+          <a:lstStyle/>
+          <a:p>
+            <a:r>
+              <a:rPr lang="nl-NL" sz="3700" dirty="0">
+                <a:solidFill>
+                  <a:srgbClr val="FFFFFF"/>
+                </a:solidFill>
+              </a:rPr>
+              <a:t>GUI </a:t>
+            </a:r>
+            <a:r>
+              <a:rPr lang="en-US" sz="3700" dirty="0">
+                <a:solidFill>
+                  <a:srgbClr val="FFFFFF"/>
+                </a:solidFill>
+              </a:rPr>
+              <a:t>Requirements</a:t>
+            </a:r>
+            <a:br>
+              <a:rPr lang="en-US" sz="3700" dirty="0">
+                <a:solidFill>
+                  <a:srgbClr val="FFFFFF"/>
+                </a:solidFill>
+              </a:rPr>
+            </a:br>
+            <a:r>
+              <a:rPr lang="en-US" sz="3700" dirty="0">
+                <a:solidFill>
+                  <a:srgbClr val="FFFFFF"/>
+                </a:solidFill>
+              </a:rPr>
+              <a:t>progression 14-10-2022</a:t>
+            </a:r>
+          </a:p>
+        </p:txBody>
+      </p:sp>
+      <p:sp>
+        <p:nvSpPr>
+          <p:cNvPr id="4" name="Tijdelijke aanduiding voor inhoud 3">
+            <a:extLst>
+              <a:ext uri="{FF2B5EF4-FFF2-40B4-BE49-F238E27FC236}">
+                <a16:creationId xmlns:a16="http://schemas.microsoft.com/office/drawing/2014/main" id="{6D7228DF-1806-51B0-95C8-07010641A4A4}"/>
+              </a:ext>
+            </a:extLst>
+          </p:cNvPr>
+          <p:cNvSpPr>
+            <a:spLocks noGrp="1"/>
+          </p:cNvSpPr>
+          <p:nvPr>
+            <p:ph sz="half" idx="1"/>
+          </p:nvPr>
+        </p:nvSpPr>
+        <p:spPr>
+          <a:xfrm>
+            <a:off x="4380783" y="294640"/>
+            <a:ext cx="3427356" cy="5791199"/>
+          </a:xfrm>
+        </p:spPr>
+        <p:txBody>
+          <a:bodyPr>
+            <a:normAutofit/>
+          </a:bodyPr>
+          <a:lstStyle/>
+          <a:p>
+            <a:pPr marL="0" indent="0">
+              <a:buNone/>
+            </a:pPr>
+            <a:r>
+              <a:rPr lang="nl-NL" sz="1000" b="0" i="0" u="none" strike="noStrike" baseline="0" dirty="0"/>
+              <a:t>GUI</a:t>
+            </a:r>
+          </a:p>
+          <a:p>
+            <a:pPr marL="342900" indent="-342900" algn="l">
+              <a:buFont typeface="+mj-lt"/>
+              <a:buAutoNum type="arabicPeriod"/>
+            </a:pPr>
+            <a:r>
+              <a:rPr lang="en-US" sz="1000" b="0" i="0" u="none" strike="noStrike" baseline="0" dirty="0">
+                <a:highlight>
+                  <a:srgbClr val="00FF00"/>
+                </a:highlight>
+                <a:latin typeface="CMR10"/>
+              </a:rPr>
+              <a:t>A way to manually input amount of measuring nodes with a minimum of 1 and a maximum </a:t>
+            </a:r>
+            <a:r>
+              <a:rPr lang="nl-NL" sz="1000" b="0" i="0" u="none" strike="noStrike" baseline="0" dirty="0">
+                <a:highlight>
+                  <a:srgbClr val="00FF00"/>
+                </a:highlight>
+                <a:latin typeface="CMR10"/>
+              </a:rPr>
+              <a:t>of 30. </a:t>
+            </a:r>
+            <a:r>
+              <a:rPr lang="nl-NL" sz="1000" b="0" i="0" u="none" strike="noStrike" baseline="0" dirty="0">
+                <a:highlight>
+                  <a:srgbClr val="00FF00"/>
+                </a:highlight>
+                <a:latin typeface="CMBX10"/>
+              </a:rPr>
+              <a:t>(Must have)</a:t>
+            </a:r>
+          </a:p>
+          <a:p>
+            <a:pPr marL="342900" indent="-342900" algn="l">
+              <a:buFont typeface="+mj-lt"/>
+              <a:buAutoNum type="arabicPeriod"/>
+            </a:pPr>
+            <a:r>
+              <a:rPr lang="en-US" sz="1000" b="0" i="0" u="none" strike="noStrike" baseline="0" dirty="0">
+                <a:highlight>
+                  <a:srgbClr val="00FF00"/>
+                </a:highlight>
+                <a:latin typeface="CMR10"/>
+              </a:rPr>
+              <a:t>A button to start OCS, thus begin measurements and generate data of at least 1 node and 1 LED, with no more than the amount of nodes and LEDs given by first requirement. </a:t>
+            </a:r>
+            <a:r>
+              <a:rPr lang="en-US" sz="1000" b="0" i="0" u="none" strike="noStrike" baseline="0" dirty="0">
+                <a:highlight>
+                  <a:srgbClr val="00FF00"/>
+                </a:highlight>
+                <a:latin typeface="CMBX10"/>
+              </a:rPr>
+              <a:t>(Must </a:t>
+            </a:r>
+            <a:r>
+              <a:rPr lang="nl-NL" sz="1000" b="0" i="0" u="none" strike="noStrike" baseline="0" dirty="0">
+                <a:highlight>
+                  <a:srgbClr val="00FF00"/>
+                </a:highlight>
+                <a:latin typeface="CMBX10"/>
+              </a:rPr>
+              <a:t>have)</a:t>
+            </a:r>
+          </a:p>
+          <a:p>
+            <a:pPr marL="342900" indent="-342900" algn="l">
+              <a:buFont typeface="+mj-lt"/>
+              <a:buAutoNum type="arabicPeriod"/>
+            </a:pPr>
+            <a:r>
+              <a:rPr lang="en-US" sz="1000" b="0" i="0" u="none" strike="noStrike" baseline="0" dirty="0">
+                <a:latin typeface="CMR10"/>
+              </a:rPr>
+              <a:t>Display the collected nodes, the LEDs, spherical and Cartesian coordinates and the found status of the LEDs of every node in a list (corresponding to the generated data). </a:t>
+            </a:r>
+            <a:r>
+              <a:rPr lang="en-US" sz="1000" b="0" i="0" u="none" strike="noStrike" baseline="0" dirty="0">
+                <a:latin typeface="CMBX10"/>
+              </a:rPr>
+              <a:t>(Must </a:t>
+            </a:r>
+            <a:r>
+              <a:rPr lang="nl-NL" sz="1000" b="0" i="0" u="none" strike="noStrike" baseline="0" dirty="0">
+                <a:latin typeface="CMBX10"/>
+              </a:rPr>
+              <a:t>have)</a:t>
+            </a:r>
+          </a:p>
+          <a:p>
+            <a:pPr marL="342900" indent="-342900" algn="l">
+              <a:buFont typeface="+mj-lt"/>
+              <a:buAutoNum type="arabicPeriod"/>
+            </a:pPr>
+            <a:r>
+              <a:rPr lang="en-US" sz="1000" b="0" i="0" u="none" strike="noStrike" baseline="0" dirty="0">
+                <a:highlight>
+                  <a:srgbClr val="00FF00"/>
+                </a:highlight>
+                <a:latin typeface="CMR10"/>
+              </a:rPr>
+              <a:t>Text box for user feedback from the GUI (error codes, function status, etc.). </a:t>
+            </a:r>
+            <a:r>
+              <a:rPr lang="en-US" sz="1000" b="0" i="0" u="none" strike="noStrike" baseline="0" dirty="0">
+                <a:highlight>
+                  <a:srgbClr val="00FF00"/>
+                </a:highlight>
+                <a:latin typeface="CMBX10"/>
+              </a:rPr>
+              <a:t>(Must have)</a:t>
+            </a:r>
+          </a:p>
+          <a:p>
+            <a:pPr marL="342900" indent="-342900" algn="l">
+              <a:buFont typeface="+mj-lt"/>
+              <a:buAutoNum type="arabicPeriod"/>
+            </a:pPr>
+            <a:r>
+              <a:rPr lang="en-US" sz="1000" b="0" i="0" u="none" strike="noStrike" baseline="0" dirty="0">
+                <a:highlight>
+                  <a:srgbClr val="00FF00"/>
+                </a:highlight>
+                <a:latin typeface="CMR10"/>
+              </a:rPr>
+              <a:t>At least 3 buttons (Measurement, Localization, Test node) to send testing commands to the master of the CAN bus. </a:t>
+            </a:r>
+            <a:r>
+              <a:rPr lang="en-US" sz="1000" b="0" i="0" u="none" strike="noStrike" baseline="0" dirty="0">
+                <a:highlight>
+                  <a:srgbClr val="00FF00"/>
+                </a:highlight>
+                <a:latin typeface="CMBX10"/>
+              </a:rPr>
+              <a:t>(Should have)</a:t>
+            </a:r>
+          </a:p>
+          <a:p>
+            <a:pPr marL="342900" indent="-342900" algn="l">
+              <a:buFont typeface="+mj-lt"/>
+              <a:buAutoNum type="arabicPeriod"/>
+            </a:pPr>
+            <a:r>
+              <a:rPr lang="en-US" sz="1000" b="0" i="0" u="none" strike="noStrike" baseline="0" dirty="0">
+                <a:highlight>
+                  <a:srgbClr val="00FF00"/>
+                </a:highlight>
+                <a:latin typeface="CMR10"/>
+              </a:rPr>
+              <a:t>Visualize nodes in a spherical coordinate model of the ADome (corresponding to the generated </a:t>
+            </a:r>
+            <a:r>
+              <a:rPr lang="nl-NL" sz="1000" b="0" i="0" u="none" strike="noStrike" baseline="0" dirty="0">
+                <a:highlight>
+                  <a:srgbClr val="00FF00"/>
+                </a:highlight>
+                <a:latin typeface="CMR10"/>
+              </a:rPr>
+              <a:t>data). </a:t>
+            </a:r>
+            <a:r>
+              <a:rPr lang="nl-NL" sz="1000" b="0" i="0" u="none" strike="noStrike" baseline="0" dirty="0">
+                <a:highlight>
+                  <a:srgbClr val="00FF00"/>
+                </a:highlight>
+                <a:latin typeface="CMBX10"/>
+              </a:rPr>
+              <a:t>(</a:t>
+            </a:r>
+            <a:r>
+              <a:rPr lang="nl-NL" sz="1000" b="0" i="0" u="none" strike="noStrike" baseline="0" dirty="0" err="1">
+                <a:highlight>
+                  <a:srgbClr val="00FF00"/>
+                </a:highlight>
+                <a:latin typeface="CMBX10"/>
+              </a:rPr>
+              <a:t>Should</a:t>
+            </a:r>
+            <a:r>
+              <a:rPr lang="nl-NL" sz="1000" b="0" i="0" u="none" strike="noStrike" baseline="0" dirty="0">
+                <a:highlight>
+                  <a:srgbClr val="00FF00"/>
+                </a:highlight>
+                <a:latin typeface="CMBX10"/>
+              </a:rPr>
+              <a:t> have)</a:t>
+            </a:r>
+          </a:p>
+          <a:p>
+            <a:pPr marL="342900" indent="-342900" algn="l">
+              <a:buFont typeface="+mj-lt"/>
+              <a:buAutoNum type="arabicPeriod"/>
+            </a:pPr>
+            <a:r>
+              <a:rPr lang="en-US" sz="1000" b="0" i="0" u="none" strike="noStrike" baseline="0" dirty="0">
+                <a:highlight>
+                  <a:srgbClr val="00FF00"/>
+                </a:highlight>
+                <a:latin typeface="CMR10"/>
+              </a:rPr>
+              <a:t>A text box interface for sending user input data to the master of the CAN bus, Must contain any ASCII character before sending. </a:t>
+            </a:r>
+            <a:r>
+              <a:rPr lang="en-US" sz="1000" b="0" i="0" u="none" strike="noStrike" baseline="0" dirty="0">
+                <a:highlight>
+                  <a:srgbClr val="00FF00"/>
+                </a:highlight>
+                <a:latin typeface="CMBX10"/>
+              </a:rPr>
+              <a:t>(Could have)</a:t>
+            </a:r>
+          </a:p>
+          <a:p>
+            <a:pPr marL="342900" indent="-342900" algn="l">
+              <a:buFont typeface="+mj-lt"/>
+              <a:buAutoNum type="arabicPeriod"/>
+            </a:pPr>
+            <a:r>
+              <a:rPr lang="en-US" sz="1000" b="0" i="0" u="none" strike="noStrike" baseline="0" dirty="0">
+                <a:latin typeface="CMR10"/>
+              </a:rPr>
+              <a:t>Display a list with the orientation of each node in degrees based off the center of the dome (corresponding to the generated data). </a:t>
+            </a:r>
+            <a:r>
+              <a:rPr lang="en-US" sz="1000" b="0" i="0" u="none" strike="noStrike" baseline="0" dirty="0">
+                <a:latin typeface="CMBX10"/>
+              </a:rPr>
+              <a:t>(Could have)</a:t>
+            </a:r>
+            <a:endParaRPr lang="en-US" sz="1000" b="0" i="0" u="none" strike="noStrike" baseline="0" dirty="0"/>
+          </a:p>
+        </p:txBody>
+      </p:sp>
+      <p:cxnSp>
+        <p:nvCxnSpPr>
+          <p:cNvPr id="12" name="Straight Connector 11">
+            <a:extLst>
+              <a:ext uri="{FF2B5EF4-FFF2-40B4-BE49-F238E27FC236}">
+                <a16:creationId xmlns:a16="http://schemas.microsoft.com/office/drawing/2014/main" id="{1F16A8D4-FE87-4604-88B2-394B5D1EB437}"/>
+              </a:ext>
+              <a:ext uri="{C183D7F6-B498-43B3-948B-1728B52AA6E4}">
+                <adec:decorative xmlns:adec="http://schemas.microsoft.com/office/drawing/2017/decorative" val="1"/>
+              </a:ext>
+            </a:extLst>
+          </p:cNvPr>
+          <p:cNvCxnSpPr>
+            <a:cxnSpLocks noGrp="1" noRot="1" noChangeAspect="1" noMove="1" noResize="1" noEditPoints="1" noAdjustHandles="1" noChangeArrowheads="1" noChangeShapeType="1"/>
+          </p:cNvCxnSpPr>
+          <p:nvPr>
+            <p:extLst>
+              <p:ext uri="{386F3935-93C4-4BCD-93E2-E3B085C9AB24}">
+                <p16:designElem xmlns:p16="http://schemas.microsoft.com/office/powerpoint/2015/main" val="1"/>
+              </p:ext>
+            </p:extLst>
+          </p:nvPr>
+        </p:nvCxnSpPr>
+        <p:spPr>
+          <a:xfrm>
+            <a:off x="8129871" y="1412488"/>
+            <a:ext cx="0" cy="3657600"/>
+          </a:xfrm>
+          <a:prstGeom prst="line">
+            <a:avLst/>
+          </a:prstGeom>
+          <a:ln w="12700">
+            <a:solidFill>
+              <a:schemeClr val="tx1">
+                <a:lumMod val="50000"/>
+                <a:lumOff val="50000"/>
+              </a:schemeClr>
+            </a:solidFill>
+          </a:ln>
+        </p:spPr>
+        <p:style>
+          <a:lnRef idx="1">
+            <a:schemeClr val="accent1"/>
+          </a:lnRef>
+          <a:fillRef idx="0">
+            <a:schemeClr val="accent1"/>
+          </a:fillRef>
+          <a:effectRef idx="0">
+            <a:schemeClr val="accent1"/>
+          </a:effectRef>
+          <a:fontRef idx="minor">
+            <a:schemeClr val="tx1"/>
+          </a:fontRef>
+        </p:style>
+      </p:cxnSp>
+      <p:sp>
+        <p:nvSpPr>
+          <p:cNvPr id="5" name="Tijdelijke aanduiding voor inhoud 4">
+            <a:extLst>
+              <a:ext uri="{FF2B5EF4-FFF2-40B4-BE49-F238E27FC236}">
+                <a16:creationId xmlns:a16="http://schemas.microsoft.com/office/drawing/2014/main" id="{A32BE88F-B080-4661-00B8-655D7D39FB67}"/>
+              </a:ext>
+            </a:extLst>
+          </p:cNvPr>
+          <p:cNvSpPr>
+            <a:spLocks noGrp="1"/>
+          </p:cNvSpPr>
+          <p:nvPr>
+            <p:ph sz="half" idx="2"/>
+          </p:nvPr>
+        </p:nvSpPr>
+        <p:spPr>
+          <a:xfrm>
+            <a:off x="8451604" y="294640"/>
+            <a:ext cx="3197701" cy="5481693"/>
+          </a:xfrm>
+        </p:spPr>
+        <p:txBody>
+          <a:bodyPr>
+            <a:noAutofit/>
+          </a:bodyPr>
+          <a:lstStyle/>
+          <a:p>
+            <a:pPr marL="0" indent="0">
+              <a:buNone/>
+            </a:pPr>
+            <a:r>
+              <a:rPr lang="nl-NL" sz="1000" b="0" i="0" u="none" strike="noStrike" baseline="0" dirty="0" err="1"/>
+              <a:t>Algorithms</a:t>
+            </a:r>
+            <a:endParaRPr lang="nl-NL" sz="1000" b="0" i="0" u="none" strike="noStrike" baseline="0" dirty="0"/>
+          </a:p>
+          <a:p>
+            <a:pPr marL="342900" indent="-342900" algn="l">
+              <a:buFont typeface="+mj-lt"/>
+              <a:buAutoNum type="arabicPeriod" startAt="10"/>
+            </a:pPr>
+            <a:r>
+              <a:rPr lang="en-US" sz="1000" b="0" i="0" u="none" strike="noStrike" baseline="0" dirty="0">
+                <a:latin typeface="CMR10"/>
+              </a:rPr>
+              <a:t>Turn on a combination of four LEDs one by one with the OCS software, so it can detect each LED of each node individually and knows which LED belongs to which node. </a:t>
+            </a:r>
+            <a:r>
+              <a:rPr lang="en-US" sz="1000" b="0" i="0" u="none" strike="noStrike" baseline="0" dirty="0">
+                <a:latin typeface="CMBX10"/>
+              </a:rPr>
+              <a:t>(Must have)</a:t>
+            </a:r>
+          </a:p>
+          <a:p>
+            <a:pPr marL="342900" indent="-342900" algn="l">
+              <a:buFont typeface="+mj-lt"/>
+              <a:buAutoNum type="arabicPeriod" startAt="10"/>
+            </a:pPr>
+            <a:r>
+              <a:rPr lang="en-US" sz="1000" b="0" i="0" u="none" strike="noStrike" baseline="0" dirty="0">
+                <a:highlight>
+                  <a:srgbClr val="00FF00"/>
+                </a:highlight>
+                <a:latin typeface="CMR10"/>
+              </a:rPr>
+              <a:t>Call OCS three times for different positions of the camera within the ADome by pressing the start OCS button three times. </a:t>
+            </a:r>
+            <a:r>
+              <a:rPr lang="en-US" sz="1000" b="0" i="0" u="none" strike="noStrike" baseline="0" dirty="0">
+                <a:highlight>
+                  <a:srgbClr val="00FF00"/>
+                </a:highlight>
+                <a:latin typeface="CMBX10"/>
+              </a:rPr>
+              <a:t>(Must have)</a:t>
+            </a:r>
+          </a:p>
+          <a:p>
+            <a:pPr marL="342900" indent="-342900" algn="l">
+              <a:buFont typeface="+mj-lt"/>
+              <a:buAutoNum type="arabicPeriod" startAt="10"/>
+            </a:pPr>
+            <a:r>
+              <a:rPr lang="en-US" sz="1000" b="0" i="0" u="none" strike="noStrike" baseline="0" dirty="0">
+                <a:highlight>
+                  <a:srgbClr val="00FF00"/>
+                </a:highlight>
+                <a:latin typeface="CMR10"/>
+              </a:rPr>
+              <a:t>Write a mock function that creates JSON test input and output data, so it corresponds to the actual data from the OCS. </a:t>
+            </a:r>
+            <a:r>
+              <a:rPr lang="en-US" sz="1000" b="0" i="0" u="none" strike="noStrike" baseline="0" dirty="0">
+                <a:highlight>
+                  <a:srgbClr val="00FF00"/>
+                </a:highlight>
+                <a:latin typeface="CMBX10"/>
+              </a:rPr>
+              <a:t>(Must have)</a:t>
+            </a:r>
+          </a:p>
+          <a:p>
+            <a:pPr marL="342900" indent="-342900" algn="l">
+              <a:buFont typeface="+mj-lt"/>
+              <a:buAutoNum type="arabicPeriod" startAt="10"/>
+            </a:pPr>
+            <a:r>
+              <a:rPr lang="en-US" sz="1000" b="0" i="0" u="none" strike="noStrike" baseline="0" dirty="0">
+                <a:highlight>
+                  <a:srgbClr val="00FF00"/>
+                </a:highlight>
+                <a:latin typeface="CMR10"/>
+              </a:rPr>
+              <a:t>Compare the amount of nodes found by OCS against the amount of nodes declared by the user in the GUI to verify if all the nodes have been found. </a:t>
+            </a:r>
+            <a:r>
+              <a:rPr lang="en-US" sz="1000" b="0" i="0" u="none" strike="noStrike" baseline="0" dirty="0">
+                <a:highlight>
+                  <a:srgbClr val="00FF00"/>
+                </a:highlight>
+                <a:latin typeface="CMBX10"/>
+              </a:rPr>
+              <a:t>(Must have)</a:t>
+            </a:r>
+          </a:p>
+          <a:p>
+            <a:pPr marL="342900" indent="-342900" algn="l">
+              <a:buFont typeface="+mj-lt"/>
+              <a:buAutoNum type="arabicPeriod" startAt="10"/>
+            </a:pPr>
+            <a:r>
+              <a:rPr lang="en-US" sz="1000" b="0" i="0" u="none" strike="noStrike" baseline="0" dirty="0">
+                <a:latin typeface="CMR10"/>
+              </a:rPr>
+              <a:t>Write back the coordinates of the node to that specific node with serial data and CAN bus. </a:t>
+            </a:r>
+            <a:r>
+              <a:rPr lang="nl-NL" sz="1000" b="0" i="0" u="none" strike="noStrike" baseline="0" dirty="0">
+                <a:latin typeface="CMBX10"/>
+              </a:rPr>
+              <a:t>(</a:t>
+            </a:r>
+            <a:r>
+              <a:rPr lang="nl-NL" sz="1000" b="0" i="0" u="none" strike="noStrike" baseline="0" dirty="0" err="1">
+                <a:latin typeface="CMBX10"/>
+              </a:rPr>
+              <a:t>Could</a:t>
+            </a:r>
+            <a:r>
+              <a:rPr lang="nl-NL" sz="1000" b="0" i="0" u="none" strike="noStrike" baseline="0" dirty="0">
+                <a:latin typeface="CMBX10"/>
+              </a:rPr>
+              <a:t> have)</a:t>
+            </a:r>
+          </a:p>
+          <a:p>
+            <a:pPr marL="342900" indent="-342900" algn="l">
+              <a:buFont typeface="+mj-lt"/>
+              <a:buAutoNum type="arabicPeriod" startAt="10"/>
+            </a:pPr>
+            <a:r>
+              <a:rPr lang="en-US" sz="1000" b="0" i="0" u="none" strike="noStrike" baseline="0" dirty="0">
+                <a:highlight>
+                  <a:srgbClr val="FF0000"/>
+                </a:highlight>
+                <a:latin typeface="CMR10"/>
+              </a:rPr>
+              <a:t>Call OCS three times for different positions of the camera within the ADome automatically, without the need of user interaction after the initial start. </a:t>
+            </a:r>
+            <a:r>
+              <a:rPr lang="en-US" sz="1000" b="0" i="0" u="none" strike="noStrike" baseline="0" dirty="0">
+                <a:highlight>
+                  <a:srgbClr val="FF0000"/>
+                </a:highlight>
+                <a:latin typeface="CMBX10"/>
+              </a:rPr>
+              <a:t>(Could have)</a:t>
+            </a:r>
+          </a:p>
+          <a:p>
+            <a:pPr marL="342900" indent="-342900" algn="l">
+              <a:buFont typeface="+mj-lt"/>
+              <a:buAutoNum type="arabicPeriod" startAt="10"/>
+            </a:pPr>
+            <a:r>
+              <a:rPr lang="en-US" sz="1000" b="0" i="0" u="none" strike="noStrike" baseline="0" dirty="0">
+                <a:latin typeface="CMR10"/>
+              </a:rPr>
+              <a:t>Retrieve the coordinates from individual nodes with serial data and CAN bus. </a:t>
+            </a:r>
+            <a:r>
+              <a:rPr lang="en-US" sz="1000" b="0" i="0" u="none" strike="noStrike" baseline="0" dirty="0">
+                <a:latin typeface="CMBX10"/>
+              </a:rPr>
+              <a:t>(Could have)</a:t>
+            </a:r>
+          </a:p>
+          <a:p>
+            <a:pPr marL="342900" indent="-342900" algn="l">
+              <a:buFont typeface="+mj-lt"/>
+              <a:buAutoNum type="arabicPeriod" startAt="10"/>
+            </a:pPr>
+            <a:r>
+              <a:rPr lang="en-US" sz="1000" b="0" i="0" u="none" strike="noStrike" baseline="0" dirty="0">
+                <a:latin typeface="CMR10"/>
+              </a:rPr>
+              <a:t>Determine the orientation of the nodes based off the coordinates of the four LEDs on the </a:t>
+            </a:r>
+            <a:r>
+              <a:rPr lang="nl-NL" sz="1000" b="0" i="0" u="none" strike="noStrike" baseline="0" dirty="0" err="1">
+                <a:latin typeface="CMR10"/>
+              </a:rPr>
+              <a:t>individual</a:t>
+            </a:r>
+            <a:r>
+              <a:rPr lang="nl-NL" sz="1000" b="0" i="0" u="none" strike="noStrike" baseline="0" dirty="0">
+                <a:latin typeface="CMR10"/>
+              </a:rPr>
+              <a:t> </a:t>
+            </a:r>
+            <a:r>
+              <a:rPr lang="nl-NL" sz="1000" b="0" i="0" u="none" strike="noStrike" baseline="0" dirty="0" err="1">
+                <a:latin typeface="CMR10"/>
+              </a:rPr>
+              <a:t>nodes</a:t>
+            </a:r>
+            <a:r>
+              <a:rPr lang="nl-NL" sz="1000" b="0" i="0" u="none" strike="noStrike" baseline="0" dirty="0">
+                <a:latin typeface="CMR10"/>
+              </a:rPr>
+              <a:t>. </a:t>
+            </a:r>
+            <a:r>
+              <a:rPr lang="nl-NL" sz="1000" b="0" i="0" u="none" strike="noStrike" baseline="0" dirty="0">
+                <a:latin typeface="CMBX10"/>
+              </a:rPr>
+              <a:t>(</a:t>
+            </a:r>
+            <a:r>
+              <a:rPr lang="nl-NL" sz="1000" b="0" i="0" u="none" strike="noStrike" baseline="0" dirty="0" err="1">
+                <a:latin typeface="CMBX10"/>
+              </a:rPr>
+              <a:t>Could</a:t>
+            </a:r>
+            <a:r>
+              <a:rPr lang="nl-NL" sz="1000" b="0" i="0" u="none" strike="noStrike" baseline="0" dirty="0">
+                <a:latin typeface="CMBX10"/>
+              </a:rPr>
+              <a:t> have)</a:t>
+            </a:r>
+          </a:p>
+          <a:p>
+            <a:pPr marL="342900" indent="-342900" algn="l">
+              <a:buFont typeface="+mj-lt"/>
+              <a:buAutoNum type="arabicPeriod" startAt="10"/>
+            </a:pPr>
+            <a:r>
+              <a:rPr lang="en-US" sz="1000" b="0" i="0" u="none" strike="noStrike" baseline="0" dirty="0">
+                <a:highlight>
+                  <a:srgbClr val="FF0000"/>
+                </a:highlight>
+                <a:latin typeface="CMR10"/>
+              </a:rPr>
+              <a:t>Translate the position of the camera from three relative positions to an absolute position centered in the dome. </a:t>
+            </a:r>
+            <a:r>
+              <a:rPr lang="en-US" sz="1000" b="0" i="0" u="none" strike="noStrike" baseline="0" dirty="0">
+                <a:highlight>
+                  <a:srgbClr val="FF0000"/>
+                </a:highlight>
+                <a:latin typeface="CMBX10"/>
+              </a:rPr>
+              <a:t>(Won’t have)</a:t>
+            </a:r>
+            <a:endParaRPr lang="nl-NL" sz="1000" dirty="0">
+              <a:highlight>
+                <a:srgbClr val="FF0000"/>
+              </a:highlight>
+            </a:endParaRPr>
+          </a:p>
+        </p:txBody>
+      </p:sp>
+    </p:spTree>
+    <p:extLst>
+      <p:ext uri="{BB962C8B-B14F-4D97-AF65-F5344CB8AC3E}">
+        <p14:creationId xmlns:p14="http://schemas.microsoft.com/office/powerpoint/2010/main" val="4085102920"/>
       </p:ext>
     </p:extLst>
   </p:cSld>
@@ -11557,7 +12921,7 @@
           <a:lstStyle/>
           <a:p>
             <a:r>
-              <a:rPr lang="nl-NL" sz="3700">
+              <a:rPr lang="nl-NL" sz="3700" dirty="0">
                 <a:solidFill>
                   <a:srgbClr val="FFFFFF"/>
                 </a:solidFill>
@@ -11565,7 +12929,7 @@
               <a:t>GUI </a:t>
             </a:r>
             <a:r>
-              <a:rPr lang="en-US" sz="3700">
+              <a:rPr lang="en-US" sz="3700" dirty="0">
                 <a:solidFill>
                   <a:srgbClr val="FFFFFF"/>
                 </a:solidFill>

</xml_diff>